<commit_message>
TItles are being modified
</commit_message>
<xml_diff>
--- a/GIT/Git_PPT.pptx
+++ b/GIT/Git_PPT.pptx
@@ -217,7 +217,7 @@
           <a:p>
             <a:fld id="{9EF85C6F-1B3B-42C3-BE32-408D38F98053}" type="datetimeFigureOut">
               <a:rPr lang="en-US" smtClean="0"/>
-              <a:t>6/20/2018</a:t>
+              <a:t>6/27/2018</a:t>
             </a:fld>
             <a:endParaRPr lang="en-US"/>
           </a:p>
@@ -731,7 +731,7 @@
           <a:p>
             <a:fld id="{63937D59-5EDB-4C39-B697-625748F703B6}" type="datetimeFigureOut">
               <a:rPr lang="en-US" smtClean="0"/>
-              <a:t>6/20/2018</a:t>
+              <a:t>6/27/2018</a:t>
             </a:fld>
             <a:endParaRPr lang="en-US"/>
           </a:p>
@@ -1008,7 +1008,7 @@
           <a:p>
             <a:fld id="{63937D59-5EDB-4C39-B697-625748F703B6}" type="datetimeFigureOut">
               <a:rPr lang="en-US" smtClean="0"/>
-              <a:t>6/20/2018</a:t>
+              <a:t>6/27/2018</a:t>
             </a:fld>
             <a:endParaRPr lang="en-US"/>
           </a:p>
@@ -1261,7 +1261,7 @@
           <a:p>
             <a:fld id="{63937D59-5EDB-4C39-B697-625748F703B6}" type="datetimeFigureOut">
               <a:rPr lang="en-US" smtClean="0"/>
-              <a:t>6/20/2018</a:t>
+              <a:t>6/27/2018</a:t>
             </a:fld>
             <a:endParaRPr lang="en-US"/>
           </a:p>
@@ -1431,7 +1431,7 @@
           <a:p>
             <a:fld id="{63937D59-5EDB-4C39-B697-625748F703B6}" type="datetimeFigureOut">
               <a:rPr lang="en-US" smtClean="0"/>
-              <a:t>6/20/2018</a:t>
+              <a:t>6/27/2018</a:t>
             </a:fld>
             <a:endParaRPr lang="en-US"/>
           </a:p>
@@ -1611,7 +1611,7 @@
           <a:p>
             <a:fld id="{63937D59-5EDB-4C39-B697-625748F703B6}" type="datetimeFigureOut">
               <a:rPr lang="en-US" smtClean="0"/>
-              <a:t>6/20/2018</a:t>
+              <a:t>6/27/2018</a:t>
             </a:fld>
             <a:endParaRPr lang="en-US"/>
           </a:p>
@@ -2209,7 +2209,7 @@
           <a:p>
             <a:fld id="{63937D59-5EDB-4C39-B697-625748F703B6}" type="datetimeFigureOut">
               <a:rPr lang="en-US" smtClean="0"/>
-              <a:t>6/20/2018</a:t>
+              <a:t>6/27/2018</a:t>
             </a:fld>
             <a:endParaRPr lang="en-US"/>
           </a:p>
@@ -2379,7 +2379,7 @@
           <a:p>
             <a:fld id="{63937D59-5EDB-4C39-B697-625748F703B6}" type="datetimeFigureOut">
               <a:rPr lang="en-US" smtClean="0"/>
-              <a:t>6/20/2018</a:t>
+              <a:t>6/27/2018</a:t>
             </a:fld>
             <a:endParaRPr lang="en-US"/>
           </a:p>
@@ -2625,7 +2625,7 @@
           <a:p>
             <a:fld id="{63937D59-5EDB-4C39-B697-625748F703B6}" type="datetimeFigureOut">
               <a:rPr lang="en-US" smtClean="0"/>
-              <a:t>6/20/2018</a:t>
+              <a:t>6/27/2018</a:t>
             </a:fld>
             <a:endParaRPr lang="en-US"/>
           </a:p>
@@ -2913,7 +2913,7 @@
           <a:p>
             <a:fld id="{63937D59-5EDB-4C39-B697-625748F703B6}" type="datetimeFigureOut">
               <a:rPr lang="en-US" smtClean="0"/>
-              <a:t>6/20/2018</a:t>
+              <a:t>6/27/2018</a:t>
             </a:fld>
             <a:endParaRPr lang="en-US"/>
           </a:p>
@@ -3335,7 +3335,7 @@
           <a:p>
             <a:fld id="{63937D59-5EDB-4C39-B697-625748F703B6}" type="datetimeFigureOut">
               <a:rPr lang="en-US" smtClean="0"/>
-              <a:t>6/20/2018</a:t>
+              <a:t>6/27/2018</a:t>
             </a:fld>
             <a:endParaRPr lang="en-US"/>
           </a:p>
@@ -3453,7 +3453,7 @@
           <a:p>
             <a:fld id="{63937D59-5EDB-4C39-B697-625748F703B6}" type="datetimeFigureOut">
               <a:rPr lang="en-US" smtClean="0"/>
-              <a:t>6/20/2018</a:t>
+              <a:t>6/27/2018</a:t>
             </a:fld>
             <a:endParaRPr lang="en-US"/>
           </a:p>
@@ -3957,7 +3957,7 @@
           <a:p>
             <a:fld id="{63937D59-5EDB-4C39-B697-625748F703B6}" type="datetimeFigureOut">
               <a:rPr lang="en-US" smtClean="0"/>
-              <a:t>6/20/2018</a:t>
+              <a:t>6/27/2018</a:t>
             </a:fld>
             <a:endParaRPr lang="en-US"/>
           </a:p>
@@ -4917,7 +4917,11 @@
           <a:p>
             <a:r>
               <a:rPr lang="en-US" altLang="ko-KR" dirty="0" smtClean="0"/>
-              <a:t>Pros continuation</a:t>
+              <a:t>Pros </a:t>
+            </a:r>
+            <a:r>
+              <a:rPr lang="en-US" altLang="ko-KR" dirty="0" smtClean="0"/>
+              <a:t>continuation…</a:t>
             </a:r>
             <a:endParaRPr lang="ko-KR" altLang="en-US" dirty="0"/>
           </a:p>
@@ -5038,7 +5042,11 @@
           <a:p>
             <a:r>
               <a:rPr lang="en-US" altLang="ko-KR" dirty="0"/>
-              <a:t>Pros continuation</a:t>
+              <a:t>Pros </a:t>
+            </a:r>
+            <a:r>
+              <a:rPr lang="en-US" altLang="ko-KR" dirty="0" smtClean="0"/>
+              <a:t>continuation…</a:t>
             </a:r>
             <a:endParaRPr lang="ko-KR" altLang="en-US" dirty="0"/>
           </a:p>
@@ -5158,8 +5166,12 @@
           <a:lstStyle/>
           <a:p>
             <a:r>
-              <a:rPr lang="en-US" altLang="ko-KR" dirty="0"/>
-              <a:t>Pros continuation</a:t>
+              <a:rPr lang="en-US" altLang="ko-KR"/>
+              <a:t>Pros </a:t>
+            </a:r>
+            <a:r>
+              <a:rPr lang="en-US" altLang="ko-KR" smtClean="0"/>
+              <a:t>continuation…</a:t>
             </a:r>
             <a:endParaRPr lang="ko-KR" altLang="en-US" dirty="0"/>
           </a:p>

</xml_diff>